<commit_message>
added back to game button above carousel and connect it to how to play button
</commit_message>
<xml_diff>
--- a/how to play.pptx
+++ b/how to play.pptx
@@ -2,16 +2,13 @@
 <file path=ppt/presentation.xml><?xml version="1.0" encoding="utf-8"?>
 <p:presentation xmlns:a="http://schemas.openxmlformats.org/drawingml/2006/main" xmlns:r="http://schemas.openxmlformats.org/officeDocument/2006/relationships" xmlns:p="http://schemas.openxmlformats.org/presentationml/2006/main" saveSubsetFonts="1" autoCompressPictures="0">
   <p:sldMasterIdLst>
-    <p:sldMasterId id="2147483780" r:id="rId1"/>
+    <p:sldMasterId id="2147484092" r:id="rId1"/>
   </p:sldMasterIdLst>
   <p:sldIdLst>
     <p:sldId id="256" r:id="rId2"/>
     <p:sldId id="257" r:id="rId3"/>
     <p:sldId id="258" r:id="rId4"/>
     <p:sldId id="259" r:id="rId5"/>
-    <p:sldId id="260" r:id="rId6"/>
-    <p:sldId id="261" r:id="rId7"/>
-    <p:sldId id="262" r:id="rId8"/>
   </p:sldIdLst>
   <p:sldSz cx="12192000" cy="6858000"/>
   <p:notesSz cx="6858000" cy="9144000"/>
@@ -451,7 +448,7 @@
     </p:spTree>
     <p:extLst>
       <p:ext uri="{BB962C8B-B14F-4D97-AF65-F5344CB8AC3E}">
-        <p14:creationId xmlns:p14="http://schemas.microsoft.com/office/powerpoint/2010/main" val="1632893554"/>
+        <p14:creationId xmlns:p14="http://schemas.microsoft.com/office/powerpoint/2010/main" val="3564057376"/>
       </p:ext>
     </p:extLst>
   </p:cSld>
@@ -769,7 +766,7 @@
     </p:spTree>
     <p:extLst>
       <p:ext uri="{BB962C8B-B14F-4D97-AF65-F5344CB8AC3E}">
-        <p14:creationId xmlns:p14="http://schemas.microsoft.com/office/powerpoint/2010/main" val="4218558459"/>
+        <p14:creationId xmlns:p14="http://schemas.microsoft.com/office/powerpoint/2010/main" val="696989912"/>
       </p:ext>
     </p:extLst>
   </p:cSld>
@@ -1257,7 +1254,7 @@
     </p:spTree>
     <p:extLst>
       <p:ext uri="{BB962C8B-B14F-4D97-AF65-F5344CB8AC3E}">
-        <p14:creationId xmlns:p14="http://schemas.microsoft.com/office/powerpoint/2010/main" val="2135012885"/>
+        <p14:creationId xmlns:p14="http://schemas.microsoft.com/office/powerpoint/2010/main" val="3826079329"/>
       </p:ext>
     </p:extLst>
   </p:cSld>
@@ -1626,7 +1623,7 @@
     </p:spTree>
     <p:extLst>
       <p:ext uri="{BB962C8B-B14F-4D97-AF65-F5344CB8AC3E}">
-        <p14:creationId xmlns:p14="http://schemas.microsoft.com/office/powerpoint/2010/main" val="1850671698"/>
+        <p14:creationId xmlns:p14="http://schemas.microsoft.com/office/powerpoint/2010/main" val="3749854380"/>
       </p:ext>
     </p:extLst>
   </p:cSld>
@@ -1899,7 +1896,7 @@
     </p:spTree>
     <p:extLst>
       <p:ext uri="{BB962C8B-B14F-4D97-AF65-F5344CB8AC3E}">
-        <p14:creationId xmlns:p14="http://schemas.microsoft.com/office/powerpoint/2010/main" val="891883373"/>
+        <p14:creationId xmlns:p14="http://schemas.microsoft.com/office/powerpoint/2010/main" val="3211004048"/>
       </p:ext>
     </p:extLst>
   </p:cSld>
@@ -2184,7 +2181,7 @@
     </p:spTree>
     <p:extLst>
       <p:ext uri="{BB962C8B-B14F-4D97-AF65-F5344CB8AC3E}">
-        <p14:creationId xmlns:p14="http://schemas.microsoft.com/office/powerpoint/2010/main" val="1619337175"/>
+        <p14:creationId xmlns:p14="http://schemas.microsoft.com/office/powerpoint/2010/main" val="340714089"/>
       </p:ext>
     </p:extLst>
   </p:cSld>
@@ -2467,7 +2464,7 @@
     </p:spTree>
     <p:extLst>
       <p:ext uri="{BB962C8B-B14F-4D97-AF65-F5344CB8AC3E}">
-        <p14:creationId xmlns:p14="http://schemas.microsoft.com/office/powerpoint/2010/main" val="2562103121"/>
+        <p14:creationId xmlns:p14="http://schemas.microsoft.com/office/powerpoint/2010/main" val="1374474238"/>
       </p:ext>
     </p:extLst>
   </p:cSld>
@@ -2810,7 +2807,7 @@
     </p:spTree>
     <p:extLst>
       <p:ext uri="{BB962C8B-B14F-4D97-AF65-F5344CB8AC3E}">
-        <p14:creationId xmlns:p14="http://schemas.microsoft.com/office/powerpoint/2010/main" val="2266450087"/>
+        <p14:creationId xmlns:p14="http://schemas.microsoft.com/office/powerpoint/2010/main" val="1083462241"/>
       </p:ext>
     </p:extLst>
   </p:cSld>
@@ -3149,13 +3146,18 @@
     </p:spTree>
     <p:extLst>
       <p:ext uri="{BB962C8B-B14F-4D97-AF65-F5344CB8AC3E}">
-        <p14:creationId xmlns:p14="http://schemas.microsoft.com/office/powerpoint/2010/main" val="893479893"/>
+        <p14:creationId xmlns:p14="http://schemas.microsoft.com/office/powerpoint/2010/main" val="2384390230"/>
       </p:ext>
     </p:extLst>
   </p:cSld>
   <p:clrMapOvr>
     <a:masterClrMapping/>
   </p:clrMapOvr>
+  <p:extLst>
+    <p:ext uri="{DCECCB84-F9BA-43D5-87BE-67443E8EF086}">
+      <p15:sldGuideLst xmlns:p15="http://schemas.microsoft.com/office/powerpoint/2012/main"/>
+    </p:ext>
+  </p:extLst>
 </p:sldLayout>
 </file>
 
@@ -3626,13 +3628,18 @@
     </p:spTree>
     <p:extLst>
       <p:ext uri="{BB962C8B-B14F-4D97-AF65-F5344CB8AC3E}">
-        <p14:creationId xmlns:p14="http://schemas.microsoft.com/office/powerpoint/2010/main" val="1974641911"/>
+        <p14:creationId xmlns:p14="http://schemas.microsoft.com/office/powerpoint/2010/main" val="2977352540"/>
       </p:ext>
     </p:extLst>
   </p:cSld>
   <p:clrMapOvr>
     <a:masterClrMapping/>
   </p:clrMapOvr>
+  <p:extLst>
+    <p:ext uri="{DCECCB84-F9BA-43D5-87BE-67443E8EF086}">
+      <p15:sldGuideLst xmlns:p15="http://schemas.microsoft.com/office/powerpoint/2012/main"/>
+    </p:ext>
+  </p:extLst>
 </p:sldLayout>
 </file>
 
@@ -3847,7 +3854,7 @@
     </p:spTree>
     <p:extLst>
       <p:ext uri="{BB962C8B-B14F-4D97-AF65-F5344CB8AC3E}">
-        <p14:creationId xmlns:p14="http://schemas.microsoft.com/office/powerpoint/2010/main" val="1753744467"/>
+        <p14:creationId xmlns:p14="http://schemas.microsoft.com/office/powerpoint/2010/main" val="465533723"/>
       </p:ext>
     </p:extLst>
   </p:cSld>
@@ -3942,7 +3949,7 @@
     </p:spTree>
     <p:extLst>
       <p:ext uri="{BB962C8B-B14F-4D97-AF65-F5344CB8AC3E}">
-        <p14:creationId xmlns:p14="http://schemas.microsoft.com/office/powerpoint/2010/main" val="4188767081"/>
+        <p14:creationId xmlns:p14="http://schemas.microsoft.com/office/powerpoint/2010/main" val="4005644139"/>
       </p:ext>
     </p:extLst>
   </p:cSld>
@@ -4409,13 +4416,18 @@
     </p:spTree>
     <p:extLst>
       <p:ext uri="{BB962C8B-B14F-4D97-AF65-F5344CB8AC3E}">
-        <p14:creationId xmlns:p14="http://schemas.microsoft.com/office/powerpoint/2010/main" val="2387682184"/>
+        <p14:creationId xmlns:p14="http://schemas.microsoft.com/office/powerpoint/2010/main" val="4118754466"/>
       </p:ext>
     </p:extLst>
   </p:cSld>
   <p:clrMapOvr>
     <a:masterClrMapping/>
   </p:clrMapOvr>
+  <p:extLst>
+    <p:ext uri="{DCECCB84-F9BA-43D5-87BE-67443E8EF086}">
+      <p15:sldGuideLst xmlns:p15="http://schemas.microsoft.com/office/powerpoint/2012/main"/>
+    </p:ext>
+  </p:extLst>
 </p:sldLayout>
 </file>
 
@@ -4732,7 +4744,7 @@
     </p:spTree>
     <p:extLst>
       <p:ext uri="{BB962C8B-B14F-4D97-AF65-F5344CB8AC3E}">
-        <p14:creationId xmlns:p14="http://schemas.microsoft.com/office/powerpoint/2010/main" val="3949934088"/>
+        <p14:creationId xmlns:p14="http://schemas.microsoft.com/office/powerpoint/2010/main" val="327630583"/>
       </p:ext>
     </p:extLst>
   </p:cSld>
@@ -4989,26 +5001,26 @@
     </p:spTree>
     <p:extLst>
       <p:ext uri="{BB962C8B-B14F-4D97-AF65-F5344CB8AC3E}">
-        <p14:creationId xmlns:p14="http://schemas.microsoft.com/office/powerpoint/2010/main" val="3755185420"/>
+        <p14:creationId xmlns:p14="http://schemas.microsoft.com/office/powerpoint/2010/main" val="10766413"/>
       </p:ext>
     </p:extLst>
   </p:cSld>
   <p:clrMap bg1="dk1" tx1="lt1" bg2="dk2" tx2="lt2" accent1="accent1" accent2="accent2" accent3="accent3" accent4="accent4" accent5="accent5" accent6="accent6" hlink="hlink" folHlink="folHlink"/>
   <p:sldLayoutIdLst>
-    <p:sldLayoutId id="2147483781" r:id="rId1"/>
-    <p:sldLayoutId id="2147483782" r:id="rId2"/>
-    <p:sldLayoutId id="2147483783" r:id="rId3"/>
-    <p:sldLayoutId id="2147483784" r:id="rId4"/>
-    <p:sldLayoutId id="2147483785" r:id="rId5"/>
-    <p:sldLayoutId id="2147483786" r:id="rId6"/>
-    <p:sldLayoutId id="2147483787" r:id="rId7"/>
-    <p:sldLayoutId id="2147483788" r:id="rId8"/>
-    <p:sldLayoutId id="2147483789" r:id="rId9"/>
-    <p:sldLayoutId id="2147483790" r:id="rId10"/>
-    <p:sldLayoutId id="2147483791" r:id="rId11"/>
-    <p:sldLayoutId id="2147483792" r:id="rId12"/>
-    <p:sldLayoutId id="2147483793" r:id="rId13"/>
-    <p:sldLayoutId id="2147483794" r:id="rId14"/>
+    <p:sldLayoutId id="2147484093" r:id="rId1"/>
+    <p:sldLayoutId id="2147484094" r:id="rId2"/>
+    <p:sldLayoutId id="2147484095" r:id="rId3"/>
+    <p:sldLayoutId id="2147484096" r:id="rId4"/>
+    <p:sldLayoutId id="2147484097" r:id="rId5"/>
+    <p:sldLayoutId id="2147484098" r:id="rId6"/>
+    <p:sldLayoutId id="2147484099" r:id="rId7"/>
+    <p:sldLayoutId id="2147484100" r:id="rId8"/>
+    <p:sldLayoutId id="2147484101" r:id="rId9"/>
+    <p:sldLayoutId id="2147484102" r:id="rId10"/>
+    <p:sldLayoutId id="2147484103" r:id="rId11"/>
+    <p:sldLayoutId id="2147484104" r:id="rId12"/>
+    <p:sldLayoutId id="2147484105" r:id="rId13"/>
+    <p:sldLayoutId id="2147484106" r:id="rId14"/>
   </p:sldLayoutIdLst>
   <p:txStyles>
     <p:titleStyle>
@@ -5370,6 +5382,11 @@
       </a:lvl9pPr>
     </p:otherStyle>
   </p:txStyles>
+  <p:extLst>
+    <p:ext uri="{27BBF7A9-308A-43DC-89C8-2F10F3537804}">
+      <p15:sldGuideLst xmlns:p15="http://schemas.microsoft.com/office/powerpoint/2012/main"/>
+    </p:ext>
+  </p:extLst>
 </p:sldMaster>
 </file>
 
@@ -5773,246 +5790,6 @@
 </p:sld>
 </file>
 
-<file path=ppt/slides/slide5.xml><?xml version="1.0" encoding="utf-8"?>
-<p:sld xmlns:a="http://schemas.openxmlformats.org/drawingml/2006/main" xmlns:r="http://schemas.openxmlformats.org/officeDocument/2006/relationships" xmlns:p="http://schemas.openxmlformats.org/presentationml/2006/main">
-  <p:cSld>
-    <p:spTree>
-      <p:nvGrpSpPr>
-        <p:cNvPr id="1" name=""/>
-        <p:cNvGrpSpPr/>
-        <p:nvPr/>
-      </p:nvGrpSpPr>
-      <p:grpSpPr>
-        <a:xfrm>
-          <a:off x="0" y="0"/>
-          <a:ext cx="0" cy="0"/>
-          <a:chOff x="0" y="0"/>
-          <a:chExt cx="0" cy="0"/>
-        </a:xfrm>
-      </p:grpSpPr>
-      <p:sp>
-        <p:nvSpPr>
-          <p:cNvPr id="2" name="Title 1">
-            <a:extLst>
-              <a:ext uri="{FF2B5EF4-FFF2-40B4-BE49-F238E27FC236}">
-                <a16:creationId xmlns:a16="http://schemas.microsoft.com/office/drawing/2014/main" id="{0130F763-A2E5-56FB-656A-B4862AB75113}"/>
-              </a:ext>
-            </a:extLst>
-          </p:cNvPr>
-          <p:cNvSpPr>
-            <a:spLocks noGrp="1"/>
-          </p:cNvSpPr>
-          <p:nvPr>
-            <p:ph type="title"/>
-          </p:nvPr>
-        </p:nvSpPr>
-        <p:spPr/>
-        <p:txBody>
-          <a:bodyPr/>
-          <a:lstStyle/>
-          <a:p>
-            <a:endParaRPr lang="en-US"/>
-          </a:p>
-        </p:txBody>
-      </p:sp>
-      <p:sp>
-        <p:nvSpPr>
-          <p:cNvPr id="3" name="Content Placeholder 2">
-            <a:extLst>
-              <a:ext uri="{FF2B5EF4-FFF2-40B4-BE49-F238E27FC236}">
-                <a16:creationId xmlns:a16="http://schemas.microsoft.com/office/drawing/2014/main" id="{9245F680-14DE-3C71-EF6B-892F2C448502}"/>
-              </a:ext>
-            </a:extLst>
-          </p:cNvPr>
-          <p:cNvSpPr>
-            <a:spLocks noGrp="1"/>
-          </p:cNvSpPr>
-          <p:nvPr>
-            <p:ph idx="1"/>
-          </p:nvPr>
-        </p:nvSpPr>
-        <p:spPr/>
-        <p:txBody>
-          <a:bodyPr/>
-          <a:lstStyle/>
-          <a:p>
-            <a:endParaRPr lang="en-US"/>
-          </a:p>
-        </p:txBody>
-      </p:sp>
-    </p:spTree>
-    <p:extLst>
-      <p:ext uri="{BB962C8B-B14F-4D97-AF65-F5344CB8AC3E}">
-        <p14:creationId xmlns:p14="http://schemas.microsoft.com/office/powerpoint/2010/main" val="3815107206"/>
-      </p:ext>
-    </p:extLst>
-  </p:cSld>
-  <p:clrMapOvr>
-    <a:masterClrMapping/>
-  </p:clrMapOvr>
-</p:sld>
-</file>
-
-<file path=ppt/slides/slide6.xml><?xml version="1.0" encoding="utf-8"?>
-<p:sld xmlns:a="http://schemas.openxmlformats.org/drawingml/2006/main" xmlns:r="http://schemas.openxmlformats.org/officeDocument/2006/relationships" xmlns:p="http://schemas.openxmlformats.org/presentationml/2006/main">
-  <p:cSld>
-    <p:spTree>
-      <p:nvGrpSpPr>
-        <p:cNvPr id="1" name=""/>
-        <p:cNvGrpSpPr/>
-        <p:nvPr/>
-      </p:nvGrpSpPr>
-      <p:grpSpPr>
-        <a:xfrm>
-          <a:off x="0" y="0"/>
-          <a:ext cx="0" cy="0"/>
-          <a:chOff x="0" y="0"/>
-          <a:chExt cx="0" cy="0"/>
-        </a:xfrm>
-      </p:grpSpPr>
-      <p:sp>
-        <p:nvSpPr>
-          <p:cNvPr id="2" name="Title 1">
-            <a:extLst>
-              <a:ext uri="{FF2B5EF4-FFF2-40B4-BE49-F238E27FC236}">
-                <a16:creationId xmlns:a16="http://schemas.microsoft.com/office/drawing/2014/main" id="{0130F763-A2E5-56FB-656A-B4862AB75113}"/>
-              </a:ext>
-            </a:extLst>
-          </p:cNvPr>
-          <p:cNvSpPr>
-            <a:spLocks noGrp="1"/>
-          </p:cNvSpPr>
-          <p:nvPr>
-            <p:ph type="title"/>
-          </p:nvPr>
-        </p:nvSpPr>
-        <p:spPr/>
-        <p:txBody>
-          <a:bodyPr/>
-          <a:lstStyle/>
-          <a:p>
-            <a:endParaRPr lang="en-US"/>
-          </a:p>
-        </p:txBody>
-      </p:sp>
-      <p:sp>
-        <p:nvSpPr>
-          <p:cNvPr id="3" name="Content Placeholder 2">
-            <a:extLst>
-              <a:ext uri="{FF2B5EF4-FFF2-40B4-BE49-F238E27FC236}">
-                <a16:creationId xmlns:a16="http://schemas.microsoft.com/office/drawing/2014/main" id="{9245F680-14DE-3C71-EF6B-892F2C448502}"/>
-              </a:ext>
-            </a:extLst>
-          </p:cNvPr>
-          <p:cNvSpPr>
-            <a:spLocks noGrp="1"/>
-          </p:cNvSpPr>
-          <p:nvPr>
-            <p:ph idx="1"/>
-          </p:nvPr>
-        </p:nvSpPr>
-        <p:spPr/>
-        <p:txBody>
-          <a:bodyPr/>
-          <a:lstStyle/>
-          <a:p>
-            <a:endParaRPr lang="en-US"/>
-          </a:p>
-        </p:txBody>
-      </p:sp>
-    </p:spTree>
-    <p:extLst>
-      <p:ext uri="{BB962C8B-B14F-4D97-AF65-F5344CB8AC3E}">
-        <p14:creationId xmlns:p14="http://schemas.microsoft.com/office/powerpoint/2010/main" val="48522474"/>
-      </p:ext>
-    </p:extLst>
-  </p:cSld>
-  <p:clrMapOvr>
-    <a:masterClrMapping/>
-  </p:clrMapOvr>
-</p:sld>
-</file>
-
-<file path=ppt/slides/slide7.xml><?xml version="1.0" encoding="utf-8"?>
-<p:sld xmlns:a="http://schemas.openxmlformats.org/drawingml/2006/main" xmlns:r="http://schemas.openxmlformats.org/officeDocument/2006/relationships" xmlns:p="http://schemas.openxmlformats.org/presentationml/2006/main">
-  <p:cSld>
-    <p:spTree>
-      <p:nvGrpSpPr>
-        <p:cNvPr id="1" name=""/>
-        <p:cNvGrpSpPr/>
-        <p:nvPr/>
-      </p:nvGrpSpPr>
-      <p:grpSpPr>
-        <a:xfrm>
-          <a:off x="0" y="0"/>
-          <a:ext cx="0" cy="0"/>
-          <a:chOff x="0" y="0"/>
-          <a:chExt cx="0" cy="0"/>
-        </a:xfrm>
-      </p:grpSpPr>
-      <p:sp>
-        <p:nvSpPr>
-          <p:cNvPr id="2" name="Title 1">
-            <a:extLst>
-              <a:ext uri="{FF2B5EF4-FFF2-40B4-BE49-F238E27FC236}">
-                <a16:creationId xmlns:a16="http://schemas.microsoft.com/office/drawing/2014/main" id="{0130F763-A2E5-56FB-656A-B4862AB75113}"/>
-              </a:ext>
-            </a:extLst>
-          </p:cNvPr>
-          <p:cNvSpPr>
-            <a:spLocks noGrp="1"/>
-          </p:cNvSpPr>
-          <p:nvPr>
-            <p:ph type="title"/>
-          </p:nvPr>
-        </p:nvSpPr>
-        <p:spPr/>
-        <p:txBody>
-          <a:bodyPr/>
-          <a:lstStyle/>
-          <a:p>
-            <a:endParaRPr lang="en-US"/>
-          </a:p>
-        </p:txBody>
-      </p:sp>
-      <p:sp>
-        <p:nvSpPr>
-          <p:cNvPr id="3" name="Content Placeholder 2">
-            <a:extLst>
-              <a:ext uri="{FF2B5EF4-FFF2-40B4-BE49-F238E27FC236}">
-                <a16:creationId xmlns:a16="http://schemas.microsoft.com/office/drawing/2014/main" id="{9245F680-14DE-3C71-EF6B-892F2C448502}"/>
-              </a:ext>
-            </a:extLst>
-          </p:cNvPr>
-          <p:cNvSpPr>
-            <a:spLocks noGrp="1"/>
-          </p:cNvSpPr>
-          <p:nvPr>
-            <p:ph idx="1"/>
-          </p:nvPr>
-        </p:nvSpPr>
-        <p:spPr/>
-        <p:txBody>
-          <a:bodyPr/>
-          <a:lstStyle/>
-          <a:p>
-            <a:endParaRPr lang="en-US"/>
-          </a:p>
-        </p:txBody>
-      </p:sp>
-    </p:spTree>
-    <p:extLst>
-      <p:ext uri="{BB962C8B-B14F-4D97-AF65-F5344CB8AC3E}">
-        <p14:creationId xmlns:p14="http://schemas.microsoft.com/office/powerpoint/2010/main" val="2992066603"/>
-      </p:ext>
-    </p:extLst>
-  </p:cSld>
-  <p:clrMapOvr>
-    <a:masterClrMapping/>
-  </p:clrMapOvr>
-</p:sld>
-</file>
-
 <file path=ppt/theme/theme1.xml><?xml version="1.0" encoding="utf-8"?>
 <a:theme xmlns:a="http://schemas.openxmlformats.org/drawingml/2006/main" name="Quotable">
   <a:themeElements>
@@ -6030,22 +5807,22 @@
         <a:srgbClr val="636363"/>
       </a:lt2>
       <a:accent1>
-        <a:srgbClr val="00C6BB"/>
+        <a:srgbClr val="9ECD33"/>
       </a:accent1>
       <a:accent2>
-        <a:srgbClr val="6FEBA0"/>
+        <a:srgbClr val="E19933"/>
       </a:accent2>
       <a:accent3>
-        <a:srgbClr val="B6DF5E"/>
+        <a:srgbClr val="DC5D3D"/>
       </a:accent3>
       <a:accent4>
-        <a:srgbClr val="EFB251"/>
+        <a:srgbClr val="A967CB"/>
       </a:accent4>
       <a:accent5>
-        <a:srgbClr val="EF755F"/>
+        <a:srgbClr val="5EA5DD"/>
       </a:accent5>
       <a:accent6>
-        <a:srgbClr val="ED515C"/>
+        <a:srgbClr val="44BEA9"/>
       </a:accent6>
       <a:hlink>
         <a:srgbClr val="8F8F8F"/>
@@ -6244,7 +6021,7 @@
   <a:extraClrSchemeLst/>
   <a:extLst>
     <a:ext uri="{05A4C25C-085E-4340-85A3-A5531E510DB2}">
-      <thm15:themeFamily xmlns:thm15="http://schemas.microsoft.com/office/thememl/2012/main" name="Quotable" id="{39EC5628-30ED-4578-ACD8-9820EDB8E15A}" vid="{6F3559E9-1A4C-49D8-94D4-F41003531C49}"/>
+      <thm15:themeFamily xmlns:thm15="http://schemas.microsoft.com/office/thememl/2012/main" name="Quotable" id="{39EC5628-30ED-4578-ACD8-9820EDB8E15A}" vid="{98D1675B-7325-48AD-994B-0DEF3379A98D}"/>
     </a:ext>
   </a:extLst>
 </a:theme>

</xml_diff>

<commit_message>
made how to play text larger
</commit_message>
<xml_diff>
--- a/how to play.pptx
+++ b/how to play.pptx
@@ -9,6 +9,7 @@
     <p:sldId id="257" r:id="rId3"/>
     <p:sldId id="258" r:id="rId4"/>
     <p:sldId id="259" r:id="rId5"/>
+    <p:sldId id="260" r:id="rId6"/>
   </p:sldIdLst>
   <p:sldSz cx="12192000" cy="6858000"/>
   <p:notesSz cx="6858000" cy="9144000"/>
@@ -5435,8 +5436,8 @@
         </p:nvSpPr>
         <p:spPr>
           <a:xfrm>
-            <a:off x="1155192" y="2074775"/>
-            <a:ext cx="9966960" cy="3035808"/>
+            <a:off x="3092490" y="2281382"/>
+            <a:ext cx="6007020" cy="1147618"/>
           </a:xfrm>
         </p:spPr>
         <p:txBody>
@@ -5444,7 +5445,7 @@
           <a:lstStyle/>
           <a:p>
             <a:r>
-              <a:rPr lang="en-US" dirty="0"/>
+              <a:rPr lang="en-US" sz="8800" dirty="0"/>
               <a:t>Hush Word</a:t>
             </a:r>
           </a:p>
@@ -5468,11 +5469,13 @@
         </p:nvSpPr>
         <p:spPr/>
         <p:txBody>
-          <a:bodyPr/>
-          <a:lstStyle/>
-          <a:p>
-            <a:r>
-              <a:rPr lang="en-US" dirty="0"/>
+          <a:bodyPr>
+            <a:noAutofit/>
+          </a:bodyPr>
+          <a:lstStyle/>
+          <a:p>
+            <a:r>
+              <a:rPr lang="en-US" sz="2600" dirty="0"/>
               <a:t>Setup and Rules</a:t>
             </a:r>
           </a:p>
@@ -5554,11 +5557,13 @@
         </p:nvSpPr>
         <p:spPr/>
         <p:txBody>
-          <a:bodyPr/>
-          <a:lstStyle/>
-          <a:p>
-            <a:r>
-              <a:rPr lang="en-US" dirty="0"/>
+          <a:bodyPr>
+            <a:normAutofit/>
+          </a:bodyPr>
+          <a:lstStyle/>
+          <a:p>
+            <a:r>
+              <a:rPr lang="en-US" sz="2600" dirty="0"/>
               <a:t>Hush Word is a word-guessing game where players need to guess a word without using specific taboo words associated with it. Players take turns to guess words, and teams earn points for each correct guess.</a:t>
             </a:r>
           </a:p>
@@ -5640,17 +5645,19 @@
         </p:nvSpPr>
         <p:spPr/>
         <p:txBody>
-          <a:bodyPr/>
-          <a:lstStyle/>
-          <a:p>
-            <a:r>
-              <a:rPr lang="en-US" dirty="0"/>
+          <a:bodyPr>
+            <a:normAutofit/>
+          </a:bodyPr>
+          <a:lstStyle/>
+          <a:p>
+            <a:r>
+              <a:rPr lang="en-US" sz="2600" dirty="0"/>
               <a:t>Gather Player: Assemble two teams. Each team will take turns guessing words.</a:t>
             </a:r>
           </a:p>
           <a:p>
             <a:r>
-              <a:rPr lang="en-US" dirty="0"/>
+              <a:rPr lang="en-US" sz="2600" dirty="0"/>
               <a:t>Prep: You will need a device with a web browser and preferably sound. </a:t>
             </a:r>
           </a:p>
@@ -5733,47 +5740,26 @@
         <p:spPr/>
         <p:txBody>
           <a:bodyPr>
-            <a:normAutofit lnSpcReduction="10000"/>
+            <a:noAutofit/>
           </a:bodyPr>
           <a:lstStyle/>
           <a:p>
             <a:r>
-              <a:rPr lang="en-US" dirty="0"/>
+              <a:rPr lang="en-US" sz="2600" dirty="0"/>
               <a:t>Only one player from each team should be able to see the card per turn, from the guessing team to see the Guess Word and Buzz Words, and an opponent to make sure the buzz words aren’t used. </a:t>
             </a:r>
           </a:p>
           <a:p>
             <a:r>
-              <a:rPr lang="en-US" dirty="0"/>
+              <a:rPr lang="en-US" sz="2600" dirty="0"/>
               <a:t>Click on the “Start” button to initiate the game timer and display the first card. </a:t>
             </a:r>
           </a:p>
           <a:p>
             <a:r>
-              <a:rPr lang="en-US" dirty="0"/>
+              <a:rPr lang="en-US" sz="2600" dirty="0"/>
               <a:t>The card with be displayed showing the first word that the team needs to guess, Guess Word, and below it, the words that can’t be said by the player viewing the card, Buzz Words. </a:t>
             </a:r>
-          </a:p>
-          <a:p>
-            <a:r>
-              <a:rPr lang="en-US" dirty="0"/>
-              <a:t>If a teammate guesses the Guess Word, click on the checkmark to add a point to the score for that team and reveal the next cards until the timer runs out. </a:t>
-            </a:r>
-          </a:p>
-          <a:p>
-            <a:r>
-              <a:rPr lang="en-US" dirty="0"/>
-              <a:t>To skip a word, press the X to get to the next card if time allows. </a:t>
-            </a:r>
-          </a:p>
-          <a:p>
-            <a:r>
-              <a:rPr lang="en-US" dirty="0"/>
-              <a:t>The players switch roles and Team 2 gets a chance to guess.</a:t>
-            </a:r>
-          </a:p>
-          <a:p>
-            <a:endParaRPr lang="en-US" dirty="0"/>
           </a:p>
         </p:txBody>
       </p:sp>
@@ -5781,6 +5767,114 @@
     <p:extLst>
       <p:ext uri="{BB962C8B-B14F-4D97-AF65-F5344CB8AC3E}">
         <p14:creationId xmlns:p14="http://schemas.microsoft.com/office/powerpoint/2010/main" val="251270903"/>
+      </p:ext>
+    </p:extLst>
+  </p:cSld>
+  <p:clrMapOvr>
+    <a:masterClrMapping/>
+  </p:clrMapOvr>
+</p:sld>
+</file>
+
+<file path=ppt/slides/slide5.xml><?xml version="1.0" encoding="utf-8"?>
+<p:sld xmlns:a="http://schemas.openxmlformats.org/drawingml/2006/main" xmlns:r="http://schemas.openxmlformats.org/officeDocument/2006/relationships" xmlns:p="http://schemas.openxmlformats.org/presentationml/2006/main">
+  <p:cSld>
+    <p:spTree>
+      <p:nvGrpSpPr>
+        <p:cNvPr id="1" name=""/>
+        <p:cNvGrpSpPr/>
+        <p:nvPr/>
+      </p:nvGrpSpPr>
+      <p:grpSpPr>
+        <a:xfrm>
+          <a:off x="0" y="0"/>
+          <a:ext cx="0" cy="0"/>
+          <a:chOff x="0" y="0"/>
+          <a:chExt cx="0" cy="0"/>
+        </a:xfrm>
+      </p:grpSpPr>
+      <p:sp>
+        <p:nvSpPr>
+          <p:cNvPr id="2" name="Title 1">
+            <a:extLst>
+              <a:ext uri="{FF2B5EF4-FFF2-40B4-BE49-F238E27FC236}">
+                <a16:creationId xmlns:a16="http://schemas.microsoft.com/office/drawing/2014/main" id="{0130F763-A2E5-56FB-656A-B4862AB75113}"/>
+              </a:ext>
+            </a:extLst>
+          </p:cNvPr>
+          <p:cNvSpPr>
+            <a:spLocks noGrp="1"/>
+          </p:cNvSpPr>
+          <p:nvPr>
+            <p:ph type="title"/>
+          </p:nvPr>
+        </p:nvSpPr>
+        <p:spPr/>
+        <p:txBody>
+          <a:bodyPr/>
+          <a:lstStyle/>
+          <a:p>
+            <a:r>
+              <a:rPr lang="en-US" dirty="0"/>
+              <a:t>Let’s </a:t>
+            </a:r>
+            <a:r>
+              <a:rPr lang="en-US"/>
+              <a:t>Play                                        …cont.</a:t>
+            </a:r>
+            <a:endParaRPr lang="en-US" dirty="0"/>
+          </a:p>
+        </p:txBody>
+      </p:sp>
+      <p:sp>
+        <p:nvSpPr>
+          <p:cNvPr id="3" name="Content Placeholder 2">
+            <a:extLst>
+              <a:ext uri="{FF2B5EF4-FFF2-40B4-BE49-F238E27FC236}">
+                <a16:creationId xmlns:a16="http://schemas.microsoft.com/office/drawing/2014/main" id="{9245F680-14DE-3C71-EF6B-892F2C448502}"/>
+              </a:ext>
+            </a:extLst>
+          </p:cNvPr>
+          <p:cNvSpPr>
+            <a:spLocks noGrp="1"/>
+          </p:cNvSpPr>
+          <p:nvPr>
+            <p:ph idx="1"/>
+          </p:nvPr>
+        </p:nvSpPr>
+        <p:spPr/>
+        <p:txBody>
+          <a:bodyPr>
+            <a:normAutofit/>
+          </a:bodyPr>
+          <a:lstStyle/>
+          <a:p>
+            <a:r>
+              <a:rPr lang="en-US" sz="2600" dirty="0"/>
+              <a:t>If a teammate guesses the Guess Word, click on the checkmark to add a point to the score for that team and reveal the next cards until the timer runs out. </a:t>
+            </a:r>
+          </a:p>
+          <a:p>
+            <a:r>
+              <a:rPr lang="en-US" sz="2600" dirty="0"/>
+              <a:t>To skip a word, press the X to get to the next card if time allows. </a:t>
+            </a:r>
+          </a:p>
+          <a:p>
+            <a:r>
+              <a:rPr lang="en-US" sz="2600" dirty="0"/>
+              <a:t>The players switch roles and Team 2 gets a chance to guess.</a:t>
+            </a:r>
+          </a:p>
+          <a:p>
+            <a:endParaRPr lang="en-US" dirty="0"/>
+          </a:p>
+        </p:txBody>
+      </p:sp>
+    </p:spTree>
+    <p:extLst>
+      <p:ext uri="{BB962C8B-B14F-4D97-AF65-F5344CB8AC3E}">
+        <p14:creationId xmlns:p14="http://schemas.microsoft.com/office/powerpoint/2010/main" val="3531181488"/>
       </p:ext>
     </p:extLst>
   </p:cSld>

</xml_diff>

<commit_message>
made cards random and word list appears for team 1
</commit_message>
<xml_diff>
--- a/how to play.pptx
+++ b/how to play.pptx
@@ -5816,13 +5816,8 @@
           <a:p>
             <a:r>
               <a:rPr lang="en-US" dirty="0"/>
-              <a:t>Let’s </a:t>
-            </a:r>
-            <a:r>
-              <a:rPr lang="en-US"/>
-              <a:t>Play                                        …cont.</a:t>
-            </a:r>
-            <a:endParaRPr lang="en-US" dirty="0"/>
+              <a:t>Let’s Play                                        …cont.</a:t>
+            </a:r>
           </a:p>
         </p:txBody>
       </p:sp>

</xml_diff>